<commit_message>
💬 fix: modify description
</commit_message>
<xml_diff>
--- a/docs/软件课设答辩.pptx
+++ b/docs/软件课设答辩.pptx
@@ -224,7 +224,7 @@
           <a:p>
             <a:fld id="{959EEDEB-74DD-4590-ADB0-3BDFBC7AA6C1}" type="datetimeFigureOut">
               <a:rPr lang="zh-CN" altLang="en-US" smtClean="0"/>
-              <a:t>2019/1/4</a:t>
+              <a:t>2019/1/20</a:t>
             </a:fld>
             <a:endParaRPr lang="zh-CN" altLang="en-US"/>
           </a:p>
@@ -620,7 +620,7 @@
           <a:p>
             <a:fld id="{698485DF-3FAB-45E9-A642-7745AB3E3AFD}" type="datetimeFigureOut">
               <a:rPr lang="zh-CN" altLang="en-US" smtClean="0"/>
-              <a:t>2019/1/4</a:t>
+              <a:t>2019/1/20</a:t>
             </a:fld>
             <a:endParaRPr lang="zh-CN" altLang="en-US"/>
           </a:p>
@@ -783,7 +783,7 @@
           <a:p>
             <a:fld id="{698485DF-3FAB-45E9-A642-7745AB3E3AFD}" type="datetimeFigureOut">
               <a:rPr lang="zh-CN" altLang="en-US" smtClean="0"/>
-              <a:t>2019/1/4</a:t>
+              <a:t>2019/1/20</a:t>
             </a:fld>
             <a:endParaRPr lang="zh-CN" altLang="en-US"/>
           </a:p>
@@ -956,7 +956,7 @@
           <a:p>
             <a:fld id="{698485DF-3FAB-45E9-A642-7745AB3E3AFD}" type="datetimeFigureOut">
               <a:rPr lang="zh-CN" altLang="en-US" smtClean="0"/>
-              <a:t>2019/1/4</a:t>
+              <a:t>2019/1/20</a:t>
             </a:fld>
             <a:endParaRPr lang="zh-CN" altLang="en-US"/>
           </a:p>
@@ -1119,7 +1119,7 @@
           <a:p>
             <a:fld id="{698485DF-3FAB-45E9-A642-7745AB3E3AFD}" type="datetimeFigureOut">
               <a:rPr lang="zh-CN" altLang="en-US" smtClean="0"/>
-              <a:t>2019/1/4</a:t>
+              <a:t>2019/1/20</a:t>
             </a:fld>
             <a:endParaRPr lang="zh-CN" altLang="en-US"/>
           </a:p>
@@ -1359,7 +1359,7 @@
           <a:p>
             <a:fld id="{698485DF-3FAB-45E9-A642-7745AB3E3AFD}" type="datetimeFigureOut">
               <a:rPr lang="zh-CN" altLang="en-US" smtClean="0"/>
-              <a:t>2019/1/4</a:t>
+              <a:t>2019/1/20</a:t>
             </a:fld>
             <a:endParaRPr lang="zh-CN" altLang="en-US"/>
           </a:p>
@@ -1583,7 +1583,7 @@
           <a:p>
             <a:fld id="{698485DF-3FAB-45E9-A642-7745AB3E3AFD}" type="datetimeFigureOut">
               <a:rPr lang="zh-CN" altLang="en-US" smtClean="0"/>
-              <a:t>2019/1/4</a:t>
+              <a:t>2019/1/20</a:t>
             </a:fld>
             <a:endParaRPr lang="zh-CN" altLang="en-US"/>
           </a:p>
@@ -1942,7 +1942,7 @@
           <a:p>
             <a:fld id="{698485DF-3FAB-45E9-A642-7745AB3E3AFD}" type="datetimeFigureOut">
               <a:rPr lang="zh-CN" altLang="en-US" smtClean="0"/>
-              <a:t>2019/1/4</a:t>
+              <a:t>2019/1/20</a:t>
             </a:fld>
             <a:endParaRPr lang="zh-CN" altLang="en-US"/>
           </a:p>
@@ -2054,7 +2054,7 @@
           <a:p>
             <a:fld id="{698485DF-3FAB-45E9-A642-7745AB3E3AFD}" type="datetimeFigureOut">
               <a:rPr lang="zh-CN" altLang="en-US" smtClean="0"/>
-              <a:t>2019/1/4</a:t>
+              <a:t>2019/1/20</a:t>
             </a:fld>
             <a:endParaRPr lang="zh-CN" altLang="en-US"/>
           </a:p>
@@ -2144,7 +2144,7 @@
           <a:p>
             <a:fld id="{698485DF-3FAB-45E9-A642-7745AB3E3AFD}" type="datetimeFigureOut">
               <a:rPr lang="zh-CN" altLang="en-US" smtClean="0"/>
-              <a:t>2019/1/4</a:t>
+              <a:t>2019/1/20</a:t>
             </a:fld>
             <a:endParaRPr lang="zh-CN" altLang="en-US"/>
           </a:p>
@@ -2414,7 +2414,7 @@
           <a:p>
             <a:fld id="{698485DF-3FAB-45E9-A642-7745AB3E3AFD}" type="datetimeFigureOut">
               <a:rPr lang="zh-CN" altLang="en-US" smtClean="0"/>
-              <a:t>2019/1/4</a:t>
+              <a:t>2019/1/20</a:t>
             </a:fld>
             <a:endParaRPr lang="zh-CN" altLang="en-US"/>
           </a:p>
@@ -2661,7 +2661,7 @@
           <a:p>
             <a:fld id="{698485DF-3FAB-45E9-A642-7745AB3E3AFD}" type="datetimeFigureOut">
               <a:rPr lang="zh-CN" altLang="en-US" smtClean="0"/>
-              <a:t>2019/1/4</a:t>
+              <a:t>2019/1/20</a:t>
             </a:fld>
             <a:endParaRPr lang="zh-CN" altLang="en-US"/>
           </a:p>
@@ -2867,7 +2867,7 @@
           <a:p>
             <a:fld id="{698485DF-3FAB-45E9-A642-7745AB3E3AFD}" type="datetimeFigureOut">
               <a:rPr lang="zh-CN" altLang="en-US" smtClean="0"/>
-              <a:t>2019/1/4</a:t>
+              <a:t>2019/1/20</a:t>
             </a:fld>
             <a:endParaRPr lang="zh-CN" altLang="en-US"/>
           </a:p>
@@ -4497,16 +4497,6 @@
               <a:buFont typeface="Wingdings" panose="05000000000000000000" pitchFamily="2" charset="2"/>
               <a:buChar char="l"/>
             </a:pPr>
-            <a:r>
-              <a:rPr lang="en-US" altLang="zh-CN" sz="1400" dirty="0">
-                <a:solidFill>
-                  <a:srgbClr val="002B41"/>
-                </a:solidFill>
-                <a:latin typeface="微软雅黑" panose="020B0503020204020204" pitchFamily="34" charset="-122"/>
-                <a:ea typeface="微软雅黑" panose="020B0503020204020204" pitchFamily="34" charset="-122"/>
-              </a:rPr>
-              <a:t>Dijkstra</a:t>
-            </a:r>
             <a:r>
               <a:rPr lang="zh-CN" altLang="en-US" sz="1400" dirty="0">
                 <a:solidFill>

</xml_diff>